<commit_message>
added FDA round 2 comments and edits
</commit_message>
<xml_diff>
--- a/figures/figures_manual.pptx
+++ b/figures/figures_manual.pptx
@@ -268,7 +268,7 @@
           <a:p>
             <a:fld id="{59F53852-59BF-3345-8923-8E4053B9CD74}" type="datetimeFigureOut">
               <a:rPr lang="en-US" smtClean="0"/>
-              <a:t>10/2/24</a:t>
+              <a:t>7/6/25</a:t>
             </a:fld>
             <a:endParaRPr lang="en-US"/>
           </a:p>
@@ -466,7 +466,7 @@
           <a:p>
             <a:fld id="{59F53852-59BF-3345-8923-8E4053B9CD74}" type="datetimeFigureOut">
               <a:rPr lang="en-US" smtClean="0"/>
-              <a:t>10/2/24</a:t>
+              <a:t>7/6/25</a:t>
             </a:fld>
             <a:endParaRPr lang="en-US"/>
           </a:p>
@@ -674,7 +674,7 @@
           <a:p>
             <a:fld id="{59F53852-59BF-3345-8923-8E4053B9CD74}" type="datetimeFigureOut">
               <a:rPr lang="en-US" smtClean="0"/>
-              <a:t>10/2/24</a:t>
+              <a:t>7/6/25</a:t>
             </a:fld>
             <a:endParaRPr lang="en-US"/>
           </a:p>
@@ -872,7 +872,7 @@
           <a:p>
             <a:fld id="{59F53852-59BF-3345-8923-8E4053B9CD74}" type="datetimeFigureOut">
               <a:rPr lang="en-US" smtClean="0"/>
-              <a:t>10/2/24</a:t>
+              <a:t>7/6/25</a:t>
             </a:fld>
             <a:endParaRPr lang="en-US"/>
           </a:p>
@@ -1147,7 +1147,7 @@
           <a:p>
             <a:fld id="{59F53852-59BF-3345-8923-8E4053B9CD74}" type="datetimeFigureOut">
               <a:rPr lang="en-US" smtClean="0"/>
-              <a:t>10/2/24</a:t>
+              <a:t>7/6/25</a:t>
             </a:fld>
             <a:endParaRPr lang="en-US"/>
           </a:p>
@@ -1412,7 +1412,7 @@
           <a:p>
             <a:fld id="{59F53852-59BF-3345-8923-8E4053B9CD74}" type="datetimeFigureOut">
               <a:rPr lang="en-US" smtClean="0"/>
-              <a:t>10/2/24</a:t>
+              <a:t>7/6/25</a:t>
             </a:fld>
             <a:endParaRPr lang="en-US"/>
           </a:p>
@@ -1824,7 +1824,7 @@
           <a:p>
             <a:fld id="{59F53852-59BF-3345-8923-8E4053B9CD74}" type="datetimeFigureOut">
               <a:rPr lang="en-US" smtClean="0"/>
-              <a:t>10/2/24</a:t>
+              <a:t>7/6/25</a:t>
             </a:fld>
             <a:endParaRPr lang="en-US"/>
           </a:p>
@@ -1965,7 +1965,7 @@
           <a:p>
             <a:fld id="{59F53852-59BF-3345-8923-8E4053B9CD74}" type="datetimeFigureOut">
               <a:rPr lang="en-US" smtClean="0"/>
-              <a:t>10/2/24</a:t>
+              <a:t>7/6/25</a:t>
             </a:fld>
             <a:endParaRPr lang="en-US"/>
           </a:p>
@@ -2078,7 +2078,7 @@
           <a:p>
             <a:fld id="{59F53852-59BF-3345-8923-8E4053B9CD74}" type="datetimeFigureOut">
               <a:rPr lang="en-US" smtClean="0"/>
-              <a:t>10/2/24</a:t>
+              <a:t>7/6/25</a:t>
             </a:fld>
             <a:endParaRPr lang="en-US"/>
           </a:p>
@@ -2389,7 +2389,7 @@
           <a:p>
             <a:fld id="{59F53852-59BF-3345-8923-8E4053B9CD74}" type="datetimeFigureOut">
               <a:rPr lang="en-US" smtClean="0"/>
-              <a:t>10/2/24</a:t>
+              <a:t>7/6/25</a:t>
             </a:fld>
             <a:endParaRPr lang="en-US"/>
           </a:p>
@@ -2677,7 +2677,7 @@
           <a:p>
             <a:fld id="{59F53852-59BF-3345-8923-8E4053B9CD74}" type="datetimeFigureOut">
               <a:rPr lang="en-US" smtClean="0"/>
-              <a:t>10/2/24</a:t>
+              <a:t>7/6/25</a:t>
             </a:fld>
             <a:endParaRPr lang="en-US"/>
           </a:p>
@@ -2918,7 +2918,7 @@
           <a:p>
             <a:fld id="{59F53852-59BF-3345-8923-8E4053B9CD74}" type="datetimeFigureOut">
               <a:rPr lang="en-US" smtClean="0"/>
-              <a:t>10/2/24</a:t>
+              <a:t>7/6/25</a:t>
             </a:fld>
             <a:endParaRPr lang="en-US"/>
           </a:p>
@@ -3700,9 +3700,9 @@
         <p:grpSpPr>
           <a:xfrm>
             <a:off x="6486402" y="97487"/>
-            <a:ext cx="5664706" cy="3927077"/>
+            <a:ext cx="5664706" cy="4161398"/>
             <a:chOff x="7163768" y="97487"/>
-            <a:chExt cx="4950573" cy="2004762"/>
+            <a:chExt cx="4950573" cy="2124382"/>
           </a:xfrm>
         </p:grpSpPr>
         <p:sp>
@@ -3720,7 +3720,7 @@
           <p:spPr>
             <a:xfrm>
               <a:off x="7163768" y="97487"/>
-              <a:ext cx="4950573" cy="2004762"/>
+              <a:ext cx="4950573" cy="2124382"/>
             </a:xfrm>
             <a:prstGeom prst="roundRect">
               <a:avLst/>
@@ -3962,6 +3962,24 @@
                   </a:solidFill>
                   <a:latin typeface="Avenir Book" panose="02000503020000020003" pitchFamily="2" charset="0"/>
                 </a:rPr>
+                <a:t>Evaluation of potential bias</a:t>
+              </a:r>
+            </a:p>
+            <a:p>
+              <a:pPr marL="285750" indent="-285750">
+                <a:spcAft>
+                  <a:spcPts val="500"/>
+                </a:spcAft>
+                <a:buFont typeface="Arial" panose="020B0604020202020204" pitchFamily="34" charset="0"/>
+                <a:buChar char="•"/>
+              </a:pPr>
+              <a:r>
+                <a:rPr lang="en-US" sz="1100" dirty="0">
+                  <a:solidFill>
+                    <a:schemeClr val="tx1"/>
+                  </a:solidFill>
+                  <a:latin typeface="Avenir Book" panose="02000503020000020003" pitchFamily="2" charset="0"/>
+                </a:rPr>
                 <a:t>Protocol is reviewed by FDA and expert panel</a:t>
               </a:r>
             </a:p>
@@ -4014,7 +4032,7 @@
           </p:blipFill>
           <p:spPr bwMode="auto">
             <a:xfrm>
-              <a:off x="9008610" y="1905001"/>
+              <a:off x="8940221" y="2036425"/>
               <a:ext cx="827628" cy="171246"/>
             </a:xfrm>
             <a:prstGeom prst="rect">
@@ -4062,159 +4080,6 @@
           </a:prstGeom>
         </p:spPr>
       </p:pic>
-      <p:grpSp>
-        <p:nvGrpSpPr>
-          <p:cNvPr id="27" name="Group 26">
-            <a:extLst>
-              <a:ext uri="{FF2B5EF4-FFF2-40B4-BE49-F238E27FC236}">
-                <a16:creationId xmlns:a16="http://schemas.microsoft.com/office/drawing/2014/main" id="{C06DFDDB-89B5-700F-244B-EA5BC2F8A7C4}"/>
-              </a:ext>
-            </a:extLst>
-          </p:cNvPr>
-          <p:cNvGrpSpPr/>
-          <p:nvPr/>
-        </p:nvGrpSpPr>
-        <p:grpSpPr>
-          <a:xfrm>
-            <a:off x="5148077" y="1871887"/>
-            <a:ext cx="1333151" cy="1333151"/>
-            <a:chOff x="5148077" y="1871887"/>
-            <a:chExt cx="1333151" cy="1333151"/>
-          </a:xfrm>
-        </p:grpSpPr>
-        <p:pic>
-          <p:nvPicPr>
-            <p:cNvPr id="2" name="Picture 2">
-              <a:extLst>
-                <a:ext uri="{FF2B5EF4-FFF2-40B4-BE49-F238E27FC236}">
-                  <a16:creationId xmlns:a16="http://schemas.microsoft.com/office/drawing/2014/main" id="{2115AD5D-25C1-FBBF-A0BE-C2F0070BA74E}"/>
-                </a:ext>
-              </a:extLst>
-            </p:cNvPr>
-            <p:cNvPicPr>
-              <a:picLocks noChangeAspect="1" noChangeArrowheads="1"/>
-            </p:cNvPicPr>
-            <p:nvPr/>
-          </p:nvPicPr>
-          <p:blipFill>
-            <a:blip r:embed="rId4">
-              <a:extLst>
-                <a:ext uri="{28A0092B-C50C-407E-A947-70E740481C1C}">
-                  <a14:useLocalDpi xmlns:a14="http://schemas.microsoft.com/office/drawing/2010/main" val="0"/>
-                </a:ext>
-              </a:extLst>
-            </a:blip>
-            <a:srcRect/>
-            <a:stretch>
-              <a:fillRect/>
-            </a:stretch>
-          </p:blipFill>
-          <p:spPr bwMode="auto">
-            <a:xfrm>
-              <a:off x="5148077" y="1871887"/>
-              <a:ext cx="1333151" cy="1333151"/>
-            </a:xfrm>
-            <a:prstGeom prst="rect">
-              <a:avLst/>
-            </a:prstGeom>
-            <a:noFill/>
-            <a:extLst>
-              <a:ext uri="{909E8E84-426E-40DD-AFC4-6F175D3DCCD1}">
-                <a14:hiddenFill xmlns:a14="http://schemas.microsoft.com/office/drawing/2010/main">
-                  <a:solidFill>
-                    <a:srgbClr val="FFFFFF"/>
-                  </a:solidFill>
-                </a14:hiddenFill>
-              </a:ext>
-            </a:extLst>
-          </p:spPr>
-        </p:pic>
-        <p:pic>
-          <p:nvPicPr>
-            <p:cNvPr id="2050" name="Picture 2">
-              <a:extLst>
-                <a:ext uri="{FF2B5EF4-FFF2-40B4-BE49-F238E27FC236}">
-                  <a16:creationId xmlns:a16="http://schemas.microsoft.com/office/drawing/2014/main" id="{B088F305-256C-82BC-04FE-E5B5EC2CD2B6}"/>
-                </a:ext>
-              </a:extLst>
-            </p:cNvPr>
-            <p:cNvPicPr>
-              <a:picLocks noChangeAspect="1" noChangeArrowheads="1"/>
-            </p:cNvPicPr>
-            <p:nvPr/>
-          </p:nvPicPr>
-          <p:blipFill>
-            <a:blip r:embed="rId5">
-              <a:extLst>
-                <a:ext uri="{28A0092B-C50C-407E-A947-70E740481C1C}">
-                  <a14:useLocalDpi xmlns:a14="http://schemas.microsoft.com/office/drawing/2010/main" val="0"/>
-                </a:ext>
-              </a:extLst>
-            </a:blip>
-            <a:srcRect/>
-            <a:stretch>
-              <a:fillRect/>
-            </a:stretch>
-          </p:blipFill>
-          <p:spPr bwMode="auto">
-            <a:xfrm>
-              <a:off x="5368125" y="2240640"/>
-              <a:ext cx="876262" cy="361116"/>
-            </a:xfrm>
-            <a:prstGeom prst="rect">
-              <a:avLst/>
-            </a:prstGeom>
-            <a:noFill/>
-            <a:extLst>
-              <a:ext uri="{909E8E84-426E-40DD-AFC4-6F175D3DCCD1}">
-                <a14:hiddenFill xmlns:a14="http://schemas.microsoft.com/office/drawing/2010/main">
-                  <a:solidFill>
-                    <a:srgbClr val="FFFFFF"/>
-                  </a:solidFill>
-                </a14:hiddenFill>
-              </a:ext>
-            </a:extLst>
-          </p:spPr>
-        </p:pic>
-        <p:sp>
-          <p:nvSpPr>
-            <p:cNvPr id="25" name="TextBox 24">
-              <a:extLst>
-                <a:ext uri="{FF2B5EF4-FFF2-40B4-BE49-F238E27FC236}">
-                  <a16:creationId xmlns:a16="http://schemas.microsoft.com/office/drawing/2014/main" id="{CCF086DB-C2A0-30ED-BE98-8039BAAC422F}"/>
-                </a:ext>
-              </a:extLst>
-            </p:cNvPr>
-            <p:cNvSpPr txBox="1"/>
-            <p:nvPr/>
-          </p:nvSpPr>
-          <p:spPr>
-            <a:xfrm>
-              <a:off x="5303388" y="2613215"/>
-              <a:ext cx="1017347" cy="461665"/>
-            </a:xfrm>
-            <a:prstGeom prst="rect">
-              <a:avLst/>
-            </a:prstGeom>
-            <a:noFill/>
-          </p:spPr>
-          <p:txBody>
-            <a:bodyPr wrap="square" rtlCol="0">
-              <a:spAutoFit/>
-            </a:bodyPr>
-            <a:lstStyle/>
-            <a:p>
-              <a:pPr algn="ctr"/>
-              <a:r>
-                <a:rPr lang="en-US" sz="1200" dirty="0">
-                  <a:latin typeface="Avenir Book" panose="02000503020000020003" pitchFamily="2" charset="0"/>
-                </a:rPr>
-                <a:t>Feedback loop</a:t>
-              </a:r>
-            </a:p>
-          </p:txBody>
-        </p:sp>
-      </p:grpSp>
       <p:sp>
         <p:nvSpPr>
           <p:cNvPr id="40" name="Right Arrow 39">
@@ -4229,8 +4094,8 @@
         </p:nvSpPr>
         <p:spPr>
           <a:xfrm rot="5400000">
-            <a:off x="10256060" y="4244319"/>
-            <a:ext cx="616997" cy="273737"/>
+            <a:off x="10362267" y="4350526"/>
+            <a:ext cx="404582" cy="273737"/>
           </a:xfrm>
           <a:prstGeom prst="rightArrow">
             <a:avLst/>
@@ -4432,7 +4297,7 @@
             <p:nvPr/>
           </p:nvPicPr>
           <p:blipFill>
-            <a:blip r:embed="rId6"/>
+            <a:blip r:embed="rId4"/>
             <a:stretch>
               <a:fillRect/>
             </a:stretch>
@@ -4462,7 +4327,7 @@
             <p:nvPr/>
           </p:nvPicPr>
           <p:blipFill>
-            <a:blip r:embed="rId7"/>
+            <a:blip r:embed="rId5"/>
             <a:stretch>
               <a:fillRect/>
             </a:stretch>
@@ -5169,7 +5034,7 @@
           <p:nvPr/>
         </p:nvPicPr>
         <p:blipFill>
-          <a:blip r:embed="rId8">
+          <a:blip r:embed="rId6">
             <a:extLst>
               <a:ext uri="{28A0092B-C50C-407E-A947-70E740481C1C}">
                 <a14:useLocalDpi xmlns:a14="http://schemas.microsoft.com/office/drawing/2010/main" val="0"/>
@@ -5745,7 +5610,7 @@
           <p:nvPr/>
         </p:nvPicPr>
         <p:blipFill rotWithShape="1">
-          <a:blip r:embed="rId9"/>
+          <a:blip r:embed="rId7"/>
           <a:srcRect l="1289" r="19616"/>
           <a:stretch/>
         </p:blipFill>
@@ -6486,7 +6351,7 @@
           <p:nvPr/>
         </p:nvPicPr>
         <p:blipFill>
-          <a:blip r:embed="rId10">
+          <a:blip r:embed="rId8">
             <a:extLst>
               <a:ext uri="{28A0092B-C50C-407E-A947-70E740481C1C}">
                 <a14:useLocalDpi xmlns:a14="http://schemas.microsoft.com/office/drawing/2010/main" val="0"/>
@@ -6500,7 +6365,7 @@
         </p:blipFill>
         <p:spPr bwMode="auto">
           <a:xfrm>
-            <a:off x="3874534" y="2559971"/>
+            <a:off x="3763324" y="2559971"/>
             <a:ext cx="1360902" cy="1360902"/>
           </a:xfrm>
           <a:prstGeom prst="rect">
@@ -6571,7 +6436,7 @@
           <p:nvPr/>
         </p:nvPicPr>
         <p:blipFill>
-          <a:blip r:embed="rId11">
+          <a:blip r:embed="rId9">
             <a:extLst>
               <a:ext uri="{28A0092B-C50C-407E-A947-70E740481C1C}">
                 <a14:useLocalDpi xmlns:a14="http://schemas.microsoft.com/office/drawing/2010/main" val="0"/>
@@ -6618,7 +6483,7 @@
           <p:nvPr/>
         </p:nvPicPr>
         <p:blipFill>
-          <a:blip r:embed="rId12">
+          <a:blip r:embed="rId10">
             <a:extLst>
               <a:ext uri="{28A0092B-C50C-407E-A947-70E740481C1C}">
                 <a14:useLocalDpi xmlns:a14="http://schemas.microsoft.com/office/drawing/2010/main" val="0"/>
@@ -6665,7 +6530,7 @@
           <p:nvPr/>
         </p:nvPicPr>
         <p:blipFill>
-          <a:blip r:embed="rId7"/>
+          <a:blip r:embed="rId5"/>
           <a:stretch>
             <a:fillRect/>
           </a:stretch>
@@ -6680,6 +6545,293 @@
           </a:prstGeom>
         </p:spPr>
       </p:pic>
+      <p:sp>
+        <p:nvSpPr>
+          <p:cNvPr id="10" name="TextBox 9">
+            <a:extLst>
+              <a:ext uri="{FF2B5EF4-FFF2-40B4-BE49-F238E27FC236}">
+                <a16:creationId xmlns:a16="http://schemas.microsoft.com/office/drawing/2014/main" id="{F0B5523C-800B-C095-2876-67021FA2D994}"/>
+              </a:ext>
+            </a:extLst>
+          </p:cNvPr>
+          <p:cNvSpPr txBox="1"/>
+          <p:nvPr/>
+        </p:nvSpPr>
+        <p:spPr>
+          <a:xfrm>
+            <a:off x="5240374" y="2170594"/>
+            <a:ext cx="1020023" cy="1077218"/>
+          </a:xfrm>
+          <a:prstGeom prst="rect">
+            <a:avLst/>
+          </a:prstGeom>
+          <a:noFill/>
+        </p:spPr>
+        <p:txBody>
+          <a:bodyPr wrap="none" rtlCol="0">
+            <a:spAutoFit/>
+          </a:bodyPr>
+          <a:lstStyle/>
+          <a:p>
+            <a:pPr algn="ctr"/>
+            <a:r>
+              <a:rPr lang="en-US" sz="3200" b="1" dirty="0"/>
+              <a:t>FDA</a:t>
+            </a:r>
+            <a:endParaRPr lang="en-US" b="1" dirty="0"/>
+          </a:p>
+          <a:p>
+            <a:pPr algn="ctr"/>
+            <a:r>
+              <a:rPr lang="en-US" sz="1600" dirty="0"/>
+              <a:t>Feedback </a:t>
+            </a:r>
+          </a:p>
+          <a:p>
+            <a:pPr algn="ctr"/>
+            <a:r>
+              <a:rPr lang="en-US" sz="1600" dirty="0"/>
+              <a:t>Loop</a:t>
+            </a:r>
+          </a:p>
+        </p:txBody>
+      </p:sp>
+      <p:sp>
+        <p:nvSpPr>
+          <p:cNvPr id="16" name="Donut 15">
+            <a:extLst>
+              <a:ext uri="{FF2B5EF4-FFF2-40B4-BE49-F238E27FC236}">
+                <a16:creationId xmlns:a16="http://schemas.microsoft.com/office/drawing/2014/main" id="{C7D78BA4-D683-3943-B247-4AE5F9E1372C}"/>
+              </a:ext>
+            </a:extLst>
+          </p:cNvPr>
+          <p:cNvSpPr/>
+          <p:nvPr/>
+        </p:nvSpPr>
+        <p:spPr>
+          <a:xfrm>
+            <a:off x="5054050" y="2093852"/>
+            <a:ext cx="1360902" cy="1294877"/>
+          </a:xfrm>
+          <a:prstGeom prst="donut">
+            <a:avLst>
+              <a:gd name="adj" fmla="val 1919"/>
+            </a:avLst>
+          </a:prstGeom>
+        </p:spPr>
+        <p:style>
+          <a:lnRef idx="2">
+            <a:schemeClr val="accent1">
+              <a:shade val="15000"/>
+            </a:schemeClr>
+          </a:lnRef>
+          <a:fillRef idx="1">
+            <a:schemeClr val="accent1"/>
+          </a:fillRef>
+          <a:effectRef idx="0">
+            <a:schemeClr val="accent1"/>
+          </a:effectRef>
+          <a:fontRef idx="minor">
+            <a:schemeClr val="lt1"/>
+          </a:fontRef>
+        </p:style>
+        <p:txBody>
+          <a:bodyPr rtlCol="0" anchor="ctr"/>
+          <a:lstStyle/>
+          <a:p>
+            <a:pPr algn="ctr"/>
+            <a:endParaRPr lang="en-US">
+              <a:solidFill>
+                <a:schemeClr val="tx1"/>
+              </a:solidFill>
+            </a:endParaRPr>
+          </a:p>
+        </p:txBody>
+      </p:sp>
+      <p:sp>
+        <p:nvSpPr>
+          <p:cNvPr id="18" name="Right Arrow 17">
+            <a:extLst>
+              <a:ext uri="{FF2B5EF4-FFF2-40B4-BE49-F238E27FC236}">
+                <a16:creationId xmlns:a16="http://schemas.microsoft.com/office/drawing/2014/main" id="{457298F9-3EE2-EA70-8586-B80DF428B890}"/>
+              </a:ext>
+            </a:extLst>
+          </p:cNvPr>
+          <p:cNvSpPr/>
+          <p:nvPr/>
+        </p:nvSpPr>
+        <p:spPr>
+          <a:xfrm rot="17271909">
+            <a:off x="5034495" y="2424821"/>
+            <a:ext cx="155633" cy="181583"/>
+          </a:xfrm>
+          <a:prstGeom prst="rightArrow">
+            <a:avLst/>
+          </a:prstGeom>
+        </p:spPr>
+        <p:style>
+          <a:lnRef idx="2">
+            <a:schemeClr val="accent1">
+              <a:shade val="15000"/>
+            </a:schemeClr>
+          </a:lnRef>
+          <a:fillRef idx="1">
+            <a:schemeClr val="accent1"/>
+          </a:fillRef>
+          <a:effectRef idx="0">
+            <a:schemeClr val="accent1"/>
+          </a:effectRef>
+          <a:fontRef idx="minor">
+            <a:schemeClr val="lt1"/>
+          </a:fontRef>
+        </p:style>
+        <p:txBody>
+          <a:bodyPr rtlCol="0" anchor="ctr"/>
+          <a:lstStyle/>
+          <a:p>
+            <a:pPr algn="ctr"/>
+            <a:endParaRPr lang="en-US"/>
+          </a:p>
+        </p:txBody>
+      </p:sp>
+      <p:sp>
+        <p:nvSpPr>
+          <p:cNvPr id="19" name="Right Arrow 18">
+            <a:extLst>
+              <a:ext uri="{FF2B5EF4-FFF2-40B4-BE49-F238E27FC236}">
+                <a16:creationId xmlns:a16="http://schemas.microsoft.com/office/drawing/2014/main" id="{B365976D-1B3E-8F2E-35DF-2BCD98273F44}"/>
+              </a:ext>
+            </a:extLst>
+          </p:cNvPr>
+          <p:cNvSpPr/>
+          <p:nvPr/>
+        </p:nvSpPr>
+        <p:spPr>
+          <a:xfrm rot="10800000">
+            <a:off x="5656852" y="3292917"/>
+            <a:ext cx="155633" cy="181583"/>
+          </a:xfrm>
+          <a:prstGeom prst="rightArrow">
+            <a:avLst/>
+          </a:prstGeom>
+        </p:spPr>
+        <p:style>
+          <a:lnRef idx="2">
+            <a:schemeClr val="accent1">
+              <a:shade val="15000"/>
+            </a:schemeClr>
+          </a:lnRef>
+          <a:fillRef idx="1">
+            <a:schemeClr val="accent1"/>
+          </a:fillRef>
+          <a:effectRef idx="0">
+            <a:schemeClr val="accent1"/>
+          </a:effectRef>
+          <a:fontRef idx="minor">
+            <a:schemeClr val="lt1"/>
+          </a:fontRef>
+        </p:style>
+        <p:txBody>
+          <a:bodyPr rtlCol="0" anchor="ctr"/>
+          <a:lstStyle/>
+          <a:p>
+            <a:pPr algn="ctr"/>
+            <a:endParaRPr lang="en-US"/>
+          </a:p>
+        </p:txBody>
+      </p:sp>
+      <p:sp>
+        <p:nvSpPr>
+          <p:cNvPr id="20" name="Right Arrow 19">
+            <a:extLst>
+              <a:ext uri="{FF2B5EF4-FFF2-40B4-BE49-F238E27FC236}">
+                <a16:creationId xmlns:a16="http://schemas.microsoft.com/office/drawing/2014/main" id="{178783E6-97F9-CCE3-2CCC-5F7868A231CC}"/>
+              </a:ext>
+            </a:extLst>
+          </p:cNvPr>
+          <p:cNvSpPr/>
+          <p:nvPr/>
+        </p:nvSpPr>
+        <p:spPr>
+          <a:xfrm rot="4135858">
+            <a:off x="6309529" y="2474184"/>
+            <a:ext cx="155633" cy="181583"/>
+          </a:xfrm>
+          <a:prstGeom prst="rightArrow">
+            <a:avLst/>
+          </a:prstGeom>
+        </p:spPr>
+        <p:style>
+          <a:lnRef idx="2">
+            <a:schemeClr val="accent1">
+              <a:shade val="15000"/>
+            </a:schemeClr>
+          </a:lnRef>
+          <a:fillRef idx="1">
+            <a:schemeClr val="accent1"/>
+          </a:fillRef>
+          <a:effectRef idx="0">
+            <a:schemeClr val="accent1"/>
+          </a:effectRef>
+          <a:fontRef idx="minor">
+            <a:schemeClr val="lt1"/>
+          </a:fontRef>
+        </p:style>
+        <p:txBody>
+          <a:bodyPr rtlCol="0" anchor="ctr"/>
+          <a:lstStyle/>
+          <a:p>
+            <a:pPr algn="ctr"/>
+            <a:endParaRPr lang="en-US"/>
+          </a:p>
+        </p:txBody>
+      </p:sp>
+      <p:sp>
+        <p:nvSpPr>
+          <p:cNvPr id="22" name="Right Arrow 21">
+            <a:extLst>
+              <a:ext uri="{FF2B5EF4-FFF2-40B4-BE49-F238E27FC236}">
+                <a16:creationId xmlns:a16="http://schemas.microsoft.com/office/drawing/2014/main" id="{EC9FED70-2CF6-DB10-4736-13E838D1B9B5}"/>
+              </a:ext>
+            </a:extLst>
+          </p:cNvPr>
+          <p:cNvSpPr/>
+          <p:nvPr/>
+        </p:nvSpPr>
+        <p:spPr>
+          <a:xfrm>
+            <a:off x="5722635" y="2017235"/>
+            <a:ext cx="155633" cy="181583"/>
+          </a:xfrm>
+          <a:prstGeom prst="rightArrow">
+            <a:avLst/>
+          </a:prstGeom>
+        </p:spPr>
+        <p:style>
+          <a:lnRef idx="2">
+            <a:schemeClr val="accent1">
+              <a:shade val="15000"/>
+            </a:schemeClr>
+          </a:lnRef>
+          <a:fillRef idx="1">
+            <a:schemeClr val="accent1"/>
+          </a:fillRef>
+          <a:effectRef idx="0">
+            <a:schemeClr val="accent1"/>
+          </a:effectRef>
+          <a:fontRef idx="minor">
+            <a:schemeClr val="lt1"/>
+          </a:fontRef>
+        </p:style>
+        <p:txBody>
+          <a:bodyPr rtlCol="0" anchor="ctr"/>
+          <a:lstStyle/>
+          <a:p>
+            <a:pPr algn="ctr"/>
+            <a:endParaRPr lang="en-US"/>
+          </a:p>
+        </p:txBody>
+      </p:sp>
     </p:spTree>
     <p:extLst>
       <p:ext uri="{BB962C8B-B14F-4D97-AF65-F5344CB8AC3E}">

</xml_diff>